<commit_message>
Changes on Complex Joins and Subqueries slides
</commit_message>
<xml_diff>
--- a/Courses/Software-Sciences/Module-3-Databases-New/10-Complex-Joins-and-Subqueries/10-Complex-Joins-and-Subqueries.pptx
+++ b/Courses/Software-Sciences/Module-3-Databases-New/10-Complex-Joins-and-Subqueries/10-Complex-Joins-and-Subqueries.pptx
@@ -447,7 +447,7 @@
           <a:p>
             <a:fld id="{4E087215-0C8F-4762-A664-737A353EC9A4}" type="datetimeFigureOut">
               <a:rPr lang="bg-BG" smtClean="0"/>
-              <a:t>18.12.2023 г.</a:t>
+              <a:t>15.4.2024 г.</a:t>
             </a:fld>
             <a:endParaRPr lang="bg-BG"/>
           </a:p>
@@ -643,7 +643,7 @@
           <a:p>
             <a:fld id="{72D84649-876A-46C9-8472-14CB09C070D8}" type="datetimeFigureOut">
               <a:rPr lang="en-US" smtClean="0"/>
-              <a:t>12/18/2023</a:t>
+              <a:t>4/15/2024</a:t>
             </a:fld>
             <a:endParaRPr lang="en-US"/>
           </a:p>
@@ -27939,13 +27939,13 @@
           <p:nvPr>
             <p:extLst>
               <p:ext uri="{D42A27DB-BD31-4B8C-83A1-F6EECF244321}">
-                <p14:modId xmlns:p14="http://schemas.microsoft.com/office/powerpoint/2010/main" val="3322265950"/>
+                <p14:modId xmlns:p14="http://schemas.microsoft.com/office/powerpoint/2010/main" val="1629445020"/>
               </p:ext>
             </p:extLst>
           </p:nvPr>
         </p:nvGraphicFramePr>
         <p:xfrm>
-          <a:off x="1828800" y="2438400"/>
+          <a:off x="1828800" y="2349000"/>
           <a:ext cx="8534400" cy="3743342"/>
         </p:xfrm>
         <a:graphic>
@@ -29293,14 +29293,7 @@
                           <a:latin typeface="Calibri"/>
                           <a:cs typeface="Calibri"/>
                         </a:rPr>
-                        <a:t>  </a:t>
-                      </a:r>
-                      <a:r>
-                        <a:rPr lang="en-US" sz="2600" dirty="0" err="1">
-                          <a:latin typeface="Calibri"/>
-                          <a:cs typeface="Calibri"/>
-                        </a:rPr>
-                        <a:t>Pesho</a:t>
+                        <a:t>  Pesho</a:t>
                       </a:r>
                       <a:endParaRPr sz="2600" dirty="0">
                         <a:latin typeface="Calibri"/>

</xml_diff>

<commit_message>
Fixes on complex joins and subqueries slides
</commit_message>
<xml_diff>
--- a/Courses/Software-Sciences/Module-3-Databases-New/10-Complex-Joins-and-Subqueries/10-Complex-Joins-and-Subqueries.pptx
+++ b/Courses/Software-Sciences/Module-3-Databases-New/10-Complex-Joins-and-Subqueries/10-Complex-Joins-and-Subqueries.pptx
@@ -447,7 +447,7 @@
           <a:p>
             <a:fld id="{4E087215-0C8F-4762-A664-737A353EC9A4}" type="datetimeFigureOut">
               <a:rPr lang="bg-BG" smtClean="0"/>
-              <a:t>15.4.2024 г.</a:t>
+              <a:t>13.5.2024 г.</a:t>
             </a:fld>
             <a:endParaRPr lang="bg-BG"/>
           </a:p>
@@ -643,7 +643,7 @@
           <a:p>
             <a:fld id="{72D84649-876A-46C9-8472-14CB09C070D8}" type="datetimeFigureOut">
               <a:rPr lang="en-US" smtClean="0"/>
-              <a:t>4/15/2024</a:t>
+              <a:t>5/13/2024</a:t>
             </a:fld>
             <a:endParaRPr lang="en-US"/>
           </a:p>
@@ -10777,39 +10777,21 @@
                                   </p:childTnLst>
                                 </p:cTn>
                               </p:par>
-                            </p:childTnLst>
-                          </p:cTn>
-                        </p:par>
-                      </p:childTnLst>
-                    </p:cTn>
-                  </p:par>
-                  <p:par>
-                    <p:cTn id="13" fill="hold">
-                      <p:stCondLst>
-                        <p:cond delay="indefinite"/>
-                      </p:stCondLst>
-                      <p:childTnLst>
-                        <p:par>
-                          <p:cTn id="14" fill="hold">
-                            <p:stCondLst>
-                              <p:cond delay="0"/>
-                            </p:stCondLst>
-                            <p:childTnLst>
                               <p:par>
-                                <p:cTn id="15" presetID="1" presetClass="entr" presetSubtype="0" fill="hold" grpId="0" nodeType="clickEffect">
+                                <p:cTn id="13" presetID="1" presetClass="entr" presetSubtype="0" fill="hold" grpId="0" nodeType="withEffect">
                                   <p:stCondLst>
                                     <p:cond delay="0"/>
                                   </p:stCondLst>
                                   <p:childTnLst>
                                     <p:set>
                                       <p:cBhvr>
-                                        <p:cTn id="16" dur="1" fill="hold">
+                                        <p:cTn id="14" dur="1" fill="hold">
                                           <p:stCondLst>
                                             <p:cond delay="0"/>
                                           </p:stCondLst>
                                         </p:cTn>
                                         <p:tgtEl>
-                                          <p:spTgt spid="13"/>
+                                          <p:spTgt spid="12"/>
                                         </p:tgtEl>
                                         <p:attrNameLst>
                                           <p:attrName>style.visibility</p:attrName>
@@ -10829,32 +10811,32 @@
                     </p:cTn>
                   </p:par>
                   <p:par>
-                    <p:cTn id="17" fill="hold">
+                    <p:cTn id="15" fill="hold">
                       <p:stCondLst>
                         <p:cond delay="indefinite"/>
                       </p:stCondLst>
                       <p:childTnLst>
                         <p:par>
-                          <p:cTn id="18" fill="hold">
+                          <p:cTn id="16" fill="hold">
                             <p:stCondLst>
                               <p:cond delay="0"/>
                             </p:stCondLst>
                             <p:childTnLst>
                               <p:par>
-                                <p:cTn id="19" presetID="1" presetClass="entr" presetSubtype="0" fill="hold" grpId="0" nodeType="clickEffect">
+                                <p:cTn id="17" presetID="1" presetClass="entr" presetSubtype="0" fill="hold" grpId="0" nodeType="clickEffect">
                                   <p:stCondLst>
                                     <p:cond delay="0"/>
                                   </p:stCondLst>
                                   <p:childTnLst>
                                     <p:set>
                                       <p:cBhvr>
-                                        <p:cTn id="20" dur="1" fill="hold">
+                                        <p:cTn id="18" dur="1" fill="hold">
                                           <p:stCondLst>
                                             <p:cond delay="0"/>
                                           </p:stCondLst>
                                         </p:cTn>
                                         <p:tgtEl>
-                                          <p:spTgt spid="12"/>
+                                          <p:spTgt spid="13"/>
                                         </p:tgtEl>
                                         <p:attrNameLst>
                                           <p:attrName>style.visibility</p:attrName>

</xml_diff>

<commit_message>
Fix on Complex Joins and Subqueries slides
</commit_message>
<xml_diff>
--- a/Courses/Software-Sciences/Module-3-Databases-New/10-Complex-Joins-and-Subqueries/10-Complex-Joins-and-Subqueries.pptx
+++ b/Courses/Software-Sciences/Module-3-Databases-New/10-Complex-Joins-and-Subqueries/10-Complex-Joins-and-Subqueries.pptx
@@ -447,7 +447,7 @@
           <a:p>
             <a:fld id="{4E087215-0C8F-4762-A664-737A353EC9A4}" type="datetimeFigureOut">
               <a:rPr lang="bg-BG" smtClean="0"/>
-              <a:t>29.07.24 г.</a:t>
+              <a:t>29.7.2024 г.</a:t>
             </a:fld>
             <a:endParaRPr lang="bg-BG"/>
           </a:p>
@@ -643,7 +643,7 @@
           <a:p>
             <a:fld id="{72D84649-876A-46C9-8472-14CB09C070D8}" type="datetimeFigureOut">
               <a:rPr lang="en-US" smtClean="0"/>
-              <a:t>7/29/24</a:t>
+              <a:t>7/29/2024</a:t>
             </a:fld>
             <a:endParaRPr lang="en-US"/>
           </a:p>
@@ -9567,70 +9567,250 @@
           <a:lstStyle/>
           <a:p>
             <a:r>
-              <a:rPr lang="bg-BG" sz="3600" dirty="0"/>
-              <a:t>Покажете </a:t>
-            </a:r>
-            <a:r>
-              <a:rPr lang="bg-BG" sz="3600" b="1" dirty="0">
+              <a:rPr lang="bg-BG" sz="3800" dirty="0"/>
+              <a:t>Имате база данни с </a:t>
+            </a:r>
+            <a:r>
+              <a:rPr lang="bg-BG" sz="3800" b="1" dirty="0"/>
+              <a:t>две</a:t>
+            </a:r>
+            <a:r>
+              <a:rPr lang="bg-BG" sz="3800" dirty="0"/>
+              <a:t> таблици</a:t>
+            </a:r>
+            <a:r>
+              <a:rPr lang="en-US" sz="3800" dirty="0"/>
+              <a:t>: </a:t>
+            </a:r>
+            <a:r>
+              <a:rPr lang="en-US" sz="3800" b="1" dirty="0">
                 <a:solidFill>
                   <a:schemeClr val="bg1"/>
                 </a:solidFill>
               </a:rPr>
-              <a:t>най-ниската средна заплата </a:t>
-            </a:r>
-            <a:r>
-              <a:rPr lang="bg-BG" sz="3600" dirty="0"/>
-              <a:t>от</a:t>
-            </a:r>
-            <a:r>
-              <a:rPr lang="en-US" sz="3600" dirty="0"/>
+              <a:t>Orders</a:t>
+            </a:r>
+            <a:r>
+              <a:rPr lang="en-US" sz="3800" dirty="0"/>
               <a:t> </a:t>
             </a:r>
             <a:r>
-              <a:rPr lang="bg-BG" sz="3600" b="1" dirty="0">
+              <a:rPr lang="bg-BG" sz="3800" dirty="0"/>
+              <a:t>и </a:t>
+            </a:r>
+            <a:r>
+              <a:rPr lang="en-US" sz="3800" b="1" dirty="0">
                 <a:solidFill>
                   <a:schemeClr val="bg1"/>
                 </a:solidFill>
               </a:rPr>
-              <a:t>всеки отдел</a:t>
-            </a:r>
-            <a:endParaRPr lang="en-US" sz="3600" dirty="0"/>
-          </a:p>
-          <a:p>
-            <a:pPr lvl="1"/>
-            <a:r>
-              <a:rPr lang="ru-RU" sz="3400" dirty="0"/>
-              <a:t>Изчислете </a:t>
-            </a:r>
-            <a:r>
-              <a:rPr lang="ru-RU" sz="3400" b="1" dirty="0">
+              <a:t>Customers</a:t>
+            </a:r>
+          </a:p>
+          <a:p>
+            <a:r>
+              <a:rPr lang="bg-BG" sz="3800" dirty="0"/>
+              <a:t>Таблицата </a:t>
+            </a:r>
+            <a:r>
+              <a:rPr lang="en-US" sz="3800" b="1" dirty="0">
                 <a:solidFill>
                   <a:schemeClr val="bg1"/>
                 </a:solidFill>
               </a:rPr>
-              <a:t>средната заплата за всеки отдел</a:t>
-            </a:r>
-            <a:endParaRPr lang="en-US" sz="3400" b="1" dirty="0">
-              <a:solidFill>
-                <a:schemeClr val="bg1"/>
-              </a:solidFill>
-            </a:endParaRPr>
-          </a:p>
-          <a:p>
-            <a:pPr lvl="1"/>
-            <a:r>
-              <a:rPr lang="ru-RU" sz="3400" dirty="0"/>
-              <a:t>След това покажете стойността на </a:t>
-            </a:r>
-            <a:r>
-              <a:rPr lang="ru-RU" sz="3400" b="1" dirty="0">
+              <a:t>Orders</a:t>
+            </a:r>
+            <a:r>
+              <a:rPr lang="en-US" sz="3800" dirty="0"/>
+              <a:t> </a:t>
+            </a:r>
+            <a:r>
+              <a:rPr lang="bg-BG" sz="3800" dirty="0"/>
+              <a:t>съдържа информация за </a:t>
+            </a:r>
+            <a:r>
+              <a:rPr lang="bg-BG" sz="3800" b="1" dirty="0"/>
+              <a:t>поръчките</a:t>
+            </a:r>
+            <a:r>
+              <a:rPr lang="bg-BG" sz="3800" dirty="0"/>
+              <a:t>, включително </a:t>
+            </a:r>
+            <a:r>
+              <a:rPr lang="en-US" sz="3800" b="1" dirty="0" err="1"/>
+              <a:t>OrderID</a:t>
+            </a:r>
+            <a:r>
+              <a:rPr lang="en-US" sz="3800" dirty="0"/>
+              <a:t>, </a:t>
+            </a:r>
+            <a:r>
+              <a:rPr lang="en-US" sz="3800" b="1" dirty="0" err="1"/>
+              <a:t>CustomerID</a:t>
+            </a:r>
+            <a:r>
+              <a:rPr lang="en-US" sz="3800" dirty="0"/>
+              <a:t> </a:t>
+            </a:r>
+            <a:r>
+              <a:rPr lang="bg-BG" sz="3800" dirty="0"/>
+              <a:t>и </a:t>
+            </a:r>
+            <a:r>
+              <a:rPr lang="en-US" sz="3800" b="1" dirty="0" err="1"/>
+              <a:t>OrderDate</a:t>
+            </a:r>
+            <a:endParaRPr lang="en-US" sz="3800" b="1" dirty="0"/>
+          </a:p>
+          <a:p>
+            <a:r>
+              <a:rPr lang="bg-BG" sz="3800" dirty="0"/>
+              <a:t>Таблицата </a:t>
+            </a:r>
+            <a:r>
+              <a:rPr lang="en-US" sz="3800" b="1" dirty="0">
                 <a:solidFill>
                   <a:schemeClr val="bg1"/>
                 </a:solidFill>
               </a:rPr>
-              <a:t>най-малката</a:t>
-            </a:r>
-            <a:endParaRPr lang="en-US" sz="3400" b="1" dirty="0">
+              <a:t>Customers</a:t>
+            </a:r>
+            <a:r>
+              <a:rPr lang="en-US" sz="3800" dirty="0"/>
+              <a:t> </a:t>
+            </a:r>
+            <a:r>
+              <a:rPr lang="bg-BG" sz="3800" dirty="0"/>
+              <a:t>съдържа информация за </a:t>
+            </a:r>
+            <a:r>
+              <a:rPr lang="bg-BG" sz="3800" b="1" dirty="0"/>
+              <a:t>клиентите</a:t>
+            </a:r>
+            <a:r>
+              <a:rPr lang="bg-BG" sz="3800" dirty="0"/>
+              <a:t>, включително </a:t>
+            </a:r>
+            <a:r>
+              <a:rPr lang="en-US" sz="3800" b="1" dirty="0" err="1"/>
+              <a:t>CustomerID</a:t>
+            </a:r>
+            <a:r>
+              <a:rPr lang="en-US" sz="3800" dirty="0"/>
+              <a:t> </a:t>
+            </a:r>
+            <a:r>
+              <a:rPr lang="bg-BG" sz="3800" dirty="0"/>
+              <a:t>и </a:t>
+            </a:r>
+            <a:r>
+              <a:rPr lang="en-US" sz="3800" b="1" dirty="0" err="1"/>
+              <a:t>CustomerName</a:t>
+            </a:r>
+            <a:endParaRPr lang="bg-BG" sz="3800" b="1" dirty="0"/>
+          </a:p>
+          <a:p>
+            <a:r>
+              <a:rPr lang="ru-RU" sz="3800" dirty="0" err="1"/>
+              <a:t>Задачата</a:t>
+            </a:r>
+            <a:r>
+              <a:rPr lang="ru-RU" sz="3800" dirty="0"/>
+              <a:t> е да се намерят </a:t>
+            </a:r>
+            <a:r>
+              <a:rPr lang="ru-RU" sz="3800" b="1" dirty="0" err="1">
+                <a:solidFill>
+                  <a:schemeClr val="bg1"/>
+                </a:solidFill>
+              </a:rPr>
+              <a:t>имената</a:t>
+            </a:r>
+            <a:r>
+              <a:rPr lang="ru-RU" sz="3800" dirty="0"/>
+              <a:t> на </a:t>
+            </a:r>
+            <a:r>
+              <a:rPr lang="ru-RU" sz="3800" b="1" dirty="0" err="1">
+                <a:solidFill>
+                  <a:schemeClr val="bg1"/>
+                </a:solidFill>
+              </a:rPr>
+              <a:t>клиентите</a:t>
+            </a:r>
+            <a:r>
+              <a:rPr lang="ru-RU" sz="3800" dirty="0"/>
+              <a:t>, </a:t>
+            </a:r>
+            <a:r>
+              <a:rPr lang="ru-RU" sz="3800" dirty="0" err="1"/>
+              <a:t>които</a:t>
+            </a:r>
+            <a:r>
+              <a:rPr lang="ru-RU" sz="3800" dirty="0"/>
+              <a:t> </a:t>
+            </a:r>
+            <a:r>
+              <a:rPr lang="ru-RU" sz="3800" dirty="0" err="1"/>
+              <a:t>имат</a:t>
+            </a:r>
+            <a:r>
+              <a:rPr lang="ru-RU" sz="3800" dirty="0"/>
+              <a:t> </a:t>
+            </a:r>
+            <a:r>
+              <a:rPr lang="ru-RU" sz="3800" b="1" dirty="0" err="1">
+                <a:solidFill>
+                  <a:schemeClr val="bg1"/>
+                </a:solidFill>
+              </a:rPr>
+              <a:t>направени</a:t>
+            </a:r>
+            <a:r>
+              <a:rPr lang="ru-RU" sz="3800" dirty="0"/>
+              <a:t> </a:t>
+            </a:r>
+            <a:r>
+              <a:rPr lang="ru-RU" sz="3800" b="1" dirty="0" err="1">
+                <a:solidFill>
+                  <a:schemeClr val="bg1"/>
+                </a:solidFill>
+              </a:rPr>
+              <a:t>поръчки</a:t>
+            </a:r>
+            <a:r>
+              <a:rPr lang="ru-RU" sz="3800" dirty="0"/>
+              <a:t> </a:t>
+            </a:r>
+            <a:r>
+              <a:rPr lang="ru-RU" sz="3800" dirty="0" err="1"/>
+              <a:t>през</a:t>
+            </a:r>
+            <a:r>
+              <a:rPr lang="ru-RU" sz="3800" dirty="0"/>
+              <a:t> </a:t>
+            </a:r>
+            <a:r>
+              <a:rPr lang="ru-RU" sz="3800" b="1" dirty="0">
+                <a:solidFill>
+                  <a:schemeClr val="bg1"/>
+                </a:solidFill>
+              </a:rPr>
+              <a:t>2023</a:t>
+            </a:r>
+            <a:r>
+              <a:rPr lang="ru-RU" sz="3800" dirty="0"/>
+              <a:t> </a:t>
+            </a:r>
+            <a:r>
+              <a:rPr lang="ru-RU" sz="3800" b="1" dirty="0">
+                <a:solidFill>
+                  <a:schemeClr val="bg1"/>
+                </a:solidFill>
+              </a:rPr>
+              <a:t>година</a:t>
+            </a:r>
+            <a:endParaRPr lang="en-US" sz="3800" b="1" dirty="0">
               <a:solidFill>
                 <a:schemeClr val="bg1"/>
               </a:solidFill>
@@ -9663,43 +9843,12 @@
             </a:r>
             <a:r>
               <a:rPr lang="bg-BG" dirty="0"/>
-              <a:t>Минимална средна заплата</a:t>
+              <a:t>Поръчки през 2023</a:t>
             </a:r>
             <a:endParaRPr lang="en-US" dirty="0"/>
           </a:p>
         </p:txBody>
       </p:sp>
-      <p:pic>
-        <p:nvPicPr>
-          <p:cNvPr id="4" name="Картина 3"/>
-          <p:cNvPicPr>
-            <a:picLocks noChangeAspect="1"/>
-          </p:cNvPicPr>
-          <p:nvPr/>
-        </p:nvPicPr>
-        <p:blipFill>
-          <a:blip r:embed="rId3" cstate="print"/>
-          <a:stretch>
-            <a:fillRect/>
-          </a:stretch>
-        </p:blipFill>
-        <p:spPr>
-          <a:xfrm>
-            <a:off x="3917061" y="4059000"/>
-            <a:ext cx="4357878" cy="1249685"/>
-          </a:xfrm>
-          <a:prstGeom prst="rect">
-            <a:avLst/>
-          </a:prstGeom>
-          <a:ln>
-            <a:solidFill>
-              <a:schemeClr val="bg2">
-                <a:lumMod val="75000"/>
-              </a:schemeClr>
-            </a:solidFill>
-          </a:ln>
-        </p:spPr>
-      </p:pic>
       <p:sp>
         <p:nvSpPr>
           <p:cNvPr id="2" name="Slide Number">
@@ -9860,21 +10009,43 @@
                                   </p:childTnLst>
                                 </p:cTn>
                               </p:par>
+                            </p:childTnLst>
+                          </p:cTn>
+                        </p:par>
+                      </p:childTnLst>
+                    </p:cTn>
+                  </p:par>
+                  <p:par>
+                    <p:cTn id="11" fill="hold">
+                      <p:stCondLst>
+                        <p:cond delay="indefinite"/>
+                      </p:stCondLst>
+                      <p:childTnLst>
+                        <p:par>
+                          <p:cTn id="12" fill="hold">
+                            <p:stCondLst>
+                              <p:cond delay="0"/>
+                            </p:stCondLst>
+                            <p:childTnLst>
                               <p:par>
-                                <p:cTn id="11" presetID="1" presetClass="entr" presetSubtype="0" fill="hold" nodeType="withEffect">
+                                <p:cTn id="13" presetID="1" presetClass="entr" presetSubtype="0" fill="hold" nodeType="clickEffect">
                                   <p:stCondLst>
                                     <p:cond delay="0"/>
                                   </p:stCondLst>
                                   <p:childTnLst>
                                     <p:set>
                                       <p:cBhvr>
-                                        <p:cTn id="12" dur="1" fill="hold">
+                                        <p:cTn id="14" dur="1" fill="hold">
                                           <p:stCondLst>
                                             <p:cond delay="0"/>
                                           </p:stCondLst>
                                         </p:cTn>
                                         <p:tgtEl>
-                                          <p:spTgt spid="4"/>
+                                          <p:spTgt spid="1068035">
+                                            <p:txEl>
+                                              <p:pRg st="3" end="3"/>
+                                            </p:txEl>
+                                          </p:spTgt>
                                         </p:tgtEl>
                                         <p:attrNameLst>
                                           <p:attrName>style.visibility</p:attrName>
@@ -9945,7 +10116,7 @@
         </p:nvSpPr>
         <p:spPr bwMode="auto">
           <a:xfrm>
-            <a:off x="1236000" y="1319768"/>
+            <a:off x="1147423" y="1494000"/>
             <a:ext cx="9897154" cy="4847967"/>
           </a:xfrm>
           <a:prstGeom prst="rect">
@@ -9980,35 +10151,18 @@
             </a:pPr>
             <a:r>
               <a:rPr lang="en-US" sz="3200" b="1" noProof="1">
+                <a:solidFill>
+                  <a:schemeClr val="bg1"/>
+                </a:solidFill>
                 <a:latin typeface="Consolas" panose="020B0609020204030204" pitchFamily="49" charset="0"/>
               </a:rPr>
               <a:t>SELECT</a:t>
             </a:r>
             <a:r>
               <a:rPr lang="en-US" sz="3200" b="1" noProof="1">
-                <a:solidFill>
-                  <a:schemeClr val="tx2"/>
-                </a:solidFill>
                 <a:latin typeface="Consolas" panose="020B0609020204030204" pitchFamily="49" charset="0"/>
               </a:rPr>
               <a:t> </a:t>
-            </a:r>
-            <a:br>
-              <a:rPr lang="en-US" sz="3200" b="1" noProof="1">
-                <a:solidFill>
-                  <a:schemeClr val="tx2"/>
-                </a:solidFill>
-                <a:latin typeface="Consolas" panose="020B0609020204030204" pitchFamily="49" charset="0"/>
-              </a:rPr>
-            </a:br>
-            <a:r>
-              <a:rPr lang="en-US" sz="3200" b="1" noProof="1">
-                <a:solidFill>
-                  <a:schemeClr val="tx2"/>
-                </a:solidFill>
-                <a:latin typeface="Consolas" panose="020B0609020204030204" pitchFamily="49" charset="0"/>
-              </a:rPr>
-              <a:t>  </a:t>
             </a:r>
             <a:r>
               <a:rPr lang="en-US" sz="3200" b="1" noProof="1">
@@ -10017,14 +10171,21 @@
                 </a:solidFill>
                 <a:latin typeface="Consolas" panose="020B0609020204030204" pitchFamily="49" charset="0"/>
               </a:rPr>
-              <a:t>MIN</a:t>
+              <a:t>DISTINCT</a:t>
             </a:r>
             <a:r>
               <a:rPr lang="en-US" sz="3200" b="1" noProof="1">
                 <a:latin typeface="Consolas" panose="020B0609020204030204" pitchFamily="49" charset="0"/>
               </a:rPr>
-              <a:t>(a.</a:t>
-            </a:r>
+              <a:t> c.CustomerName </a:t>
+            </a:r>
+          </a:p>
+          <a:p>
+            <a:pPr>
+              <a:lnSpc>
+                <a:spcPct val="105000"/>
+              </a:lnSpc>
+            </a:pPr>
             <a:r>
               <a:rPr lang="en-US" sz="3200" b="1" noProof="1">
                 <a:solidFill>
@@ -10032,38 +10193,21 @@
                 </a:solidFill>
                 <a:latin typeface="Consolas" panose="020B0609020204030204" pitchFamily="49" charset="0"/>
               </a:rPr>
-              <a:t>AverageSalary</a:t>
+              <a:t>FROM</a:t>
             </a:r>
             <a:r>
               <a:rPr lang="en-US" sz="3200" b="1" noProof="1">
                 <a:latin typeface="Consolas" panose="020B0609020204030204" pitchFamily="49" charset="0"/>
               </a:rPr>
-              <a:t>)</a:t>
-            </a:r>
-            <a:r>
-              <a:rPr lang="en-US" sz="3200" b="1" noProof="1">
-                <a:solidFill>
-                  <a:schemeClr val="tx2"/>
-                </a:solidFill>
-                <a:latin typeface="Consolas" panose="020B0609020204030204" pitchFamily="49" charset="0"/>
-              </a:rPr>
-              <a:t> </a:t>
-            </a:r>
-            <a:r>
-              <a:rPr lang="en-US" sz="3200" b="1" noProof="1">
-                <a:latin typeface="Consolas" panose="020B0609020204030204" pitchFamily="49" charset="0"/>
-              </a:rPr>
-              <a:t>AS</a:t>
-            </a:r>
-            <a:r>
-              <a:rPr lang="en-US" sz="3200" b="1" noProof="1">
-                <a:solidFill>
-                  <a:schemeClr val="tx2"/>
-                </a:solidFill>
-                <a:latin typeface="Consolas" panose="020B0609020204030204" pitchFamily="49" charset="0"/>
-              </a:rPr>
-              <a:t> </a:t>
-            </a:r>
+              <a:t> Customers c </a:t>
+            </a:r>
+          </a:p>
+          <a:p>
+            <a:pPr lvl="1">
+              <a:lnSpc>
+                <a:spcPct val="105000"/>
+              </a:lnSpc>
+            </a:pPr>
             <a:r>
               <a:rPr lang="en-US" sz="3200" b="1" noProof="1">
                 <a:solidFill>
@@ -10071,79 +10215,36 @@
                 </a:solidFill>
                 <a:latin typeface="Consolas" panose="020B0609020204030204" pitchFamily="49" charset="0"/>
               </a:rPr>
-              <a:t>MinAverageSalary</a:t>
-            </a:r>
-          </a:p>
-          <a:p>
-            <a:pPr>
+              <a:t>WHERE</a:t>
+            </a:r>
+            <a:r>
+              <a:rPr lang="en-US" sz="3200" b="1" noProof="1">
+                <a:latin typeface="Consolas" panose="020B0609020204030204" pitchFamily="49" charset="0"/>
+              </a:rPr>
+              <a:t> </a:t>
+            </a:r>
+            <a:r>
+              <a:rPr lang="en-US" sz="3200" b="1" noProof="1">
+                <a:solidFill>
+                  <a:schemeClr val="bg1"/>
+                </a:solidFill>
+                <a:latin typeface="Consolas" panose="020B0609020204030204" pitchFamily="49" charset="0"/>
+              </a:rPr>
+              <a:t>EXISTS</a:t>
+            </a:r>
+            <a:r>
+              <a:rPr lang="en-US" sz="3200" b="1" noProof="1">
+                <a:latin typeface="Consolas" panose="020B0609020204030204" pitchFamily="49" charset="0"/>
+              </a:rPr>
+              <a:t> ( </a:t>
+            </a:r>
+          </a:p>
+          <a:p>
+            <a:pPr lvl="1">
               <a:lnSpc>
                 <a:spcPct val="105000"/>
               </a:lnSpc>
             </a:pPr>
-            <a:r>
-              <a:rPr lang="en-US" sz="3200" b="1" noProof="1">
-                <a:solidFill>
-                  <a:schemeClr val="tx2"/>
-                </a:solidFill>
-                <a:latin typeface="Consolas" panose="020B0609020204030204" pitchFamily="49" charset="0"/>
-              </a:rPr>
-              <a:t>  </a:t>
-            </a:r>
-            <a:r>
-              <a:rPr lang="en-US" sz="3200" b="1" noProof="1">
-                <a:latin typeface="Consolas" panose="020B0609020204030204" pitchFamily="49" charset="0"/>
-              </a:rPr>
-              <a:t>FROM</a:t>
-            </a:r>
-            <a:r>
-              <a:rPr lang="en-US" sz="3200" b="1" noProof="1">
-                <a:solidFill>
-                  <a:schemeClr val="tx2"/>
-                </a:solidFill>
-                <a:latin typeface="Consolas" panose="020B0609020204030204" pitchFamily="49" charset="0"/>
-              </a:rPr>
-              <a:t> </a:t>
-            </a:r>
-          </a:p>
-          <a:p>
-            <a:pPr>
-              <a:lnSpc>
-                <a:spcPct val="105000"/>
-              </a:lnSpc>
-            </a:pPr>
-            <a:r>
-              <a:rPr lang="en-US" sz="3200" b="1" noProof="1">
-                <a:solidFill>
-                  <a:schemeClr val="tx2"/>
-                </a:solidFill>
-                <a:latin typeface="Consolas" panose="020B0609020204030204" pitchFamily="49" charset="0"/>
-              </a:rPr>
-              <a:t>  </a:t>
-            </a:r>
-            <a:r>
-              <a:rPr lang="en-US" sz="3200" b="1" noProof="1">
-                <a:latin typeface="Consolas" panose="020B0609020204030204" pitchFamily="49" charset="0"/>
-              </a:rPr>
-              <a:t>(</a:t>
-            </a:r>
-          </a:p>
-          <a:p>
-            <a:pPr>
-              <a:lnSpc>
-                <a:spcPct val="105000"/>
-              </a:lnSpc>
-            </a:pPr>
-            <a:r>
-              <a:rPr lang="en-US" sz="3200" b="1" noProof="1">
-                <a:solidFill>
-                  <a:schemeClr val="tx2">
-                    <a:lumMod val="75000"/>
-                  </a:schemeClr>
-                </a:solidFill>
-                <a:latin typeface="Consolas" panose="020B0609020204030204" pitchFamily="49" charset="0"/>
-              </a:rPr>
-              <a:t>     </a:t>
-            </a:r>
             <a:r>
               <a:rPr lang="en-US" sz="3200" b="1" noProof="1">
                 <a:solidFill>
@@ -10155,35 +10256,17 @@
             </a:r>
             <a:r>
               <a:rPr lang="en-US" sz="3200" b="1" noProof="1">
-                <a:solidFill>
-                  <a:schemeClr val="tx2"/>
-                </a:solidFill>
                 <a:latin typeface="Consolas" panose="020B0609020204030204" pitchFamily="49" charset="0"/>
               </a:rPr>
-              <a:t> </a:t>
-            </a:r>
-            <a:r>
-              <a:rPr lang="en-US" sz="3200" b="1" noProof="1">
-                <a:latin typeface="Consolas" panose="020B0609020204030204" pitchFamily="49" charset="0"/>
-              </a:rPr>
-              <a:t>e.DepartmentID, </a:t>
-            </a:r>
-          </a:p>
-          <a:p>
-            <a:pPr>
+              <a:t> 1</a:t>
+            </a:r>
+          </a:p>
+          <a:p>
+            <a:pPr lvl="1">
               <a:lnSpc>
                 <a:spcPct val="105000"/>
               </a:lnSpc>
             </a:pPr>
-            <a:r>
-              <a:rPr lang="en-US" sz="3200" b="1" noProof="1">
-                <a:solidFill>
-                  <a:schemeClr val="tx2"/>
-                </a:solidFill>
-                <a:latin typeface="Consolas" panose="020B0609020204030204" pitchFamily="49" charset="0"/>
-              </a:rPr>
-              <a:t>            </a:t>
-            </a:r>
             <a:r>
               <a:rPr lang="en-US" sz="3200" b="1" noProof="1">
                 <a:solidFill>
@@ -10191,14 +10274,21 @@
                 </a:solidFill>
                 <a:latin typeface="Consolas" panose="020B0609020204030204" pitchFamily="49" charset="0"/>
               </a:rPr>
-              <a:t>AVG</a:t>
+              <a:t>FROM</a:t>
             </a:r>
             <a:r>
               <a:rPr lang="en-US" sz="3200" b="1" noProof="1">
                 <a:latin typeface="Consolas" panose="020B0609020204030204" pitchFamily="49" charset="0"/>
               </a:rPr>
-              <a:t>(</a:t>
-            </a:r>
+              <a:t> Orders o </a:t>
+            </a:r>
+          </a:p>
+          <a:p>
+            <a:pPr lvl="1">
+              <a:lnSpc>
+                <a:spcPct val="105000"/>
+              </a:lnSpc>
+            </a:pPr>
             <a:r>
               <a:rPr lang="en-US" sz="3200" b="1" noProof="1">
                 <a:solidFill>
@@ -10206,37 +10296,13 @@
                 </a:solidFill>
                 <a:latin typeface="Consolas" panose="020B0609020204030204" pitchFamily="49" charset="0"/>
               </a:rPr>
-              <a:t>e.Salary</a:t>
+              <a:t>WHERE</a:t>
             </a:r>
             <a:r>
               <a:rPr lang="en-US" sz="3200" b="1" noProof="1">
                 <a:latin typeface="Consolas" panose="020B0609020204030204" pitchFamily="49" charset="0"/>
               </a:rPr>
-              <a:t>)</a:t>
-            </a:r>
-            <a:r>
-              <a:rPr lang="en-US" sz="3200" b="1" noProof="1">
-                <a:solidFill>
-                  <a:schemeClr val="tx2"/>
-                </a:solidFill>
-                <a:latin typeface="Consolas" panose="020B0609020204030204" pitchFamily="49" charset="0"/>
-              </a:rPr>
-              <a:t> </a:t>
-            </a:r>
-            <a:r>
-              <a:rPr lang="en-US" sz="3200" b="1" noProof="1">
-                <a:latin typeface="Consolas" panose="020B0609020204030204" pitchFamily="49" charset="0"/>
-              </a:rPr>
-              <a:t>AS</a:t>
-            </a:r>
-            <a:r>
-              <a:rPr lang="en-US" sz="3200" b="1" noProof="1">
-                <a:solidFill>
-                  <a:schemeClr val="tx2"/>
-                </a:solidFill>
-                <a:latin typeface="Consolas" panose="020B0609020204030204" pitchFamily="49" charset="0"/>
-              </a:rPr>
-              <a:t> </a:t>
+              <a:t> o.CustomerID = c.CustomerID </a:t>
             </a:r>
             <a:r>
               <a:rPr lang="en-US" sz="3200" b="1" noProof="1">
@@ -10245,38 +10311,13 @@
                 </a:solidFill>
                 <a:latin typeface="Consolas" panose="020B0609020204030204" pitchFamily="49" charset="0"/>
               </a:rPr>
-              <a:t>AverageSalary</a:t>
-            </a:r>
-          </a:p>
-          <a:p>
-            <a:pPr>
-              <a:lnSpc>
-                <a:spcPct val="105000"/>
-              </a:lnSpc>
-            </a:pPr>
-            <a:r>
-              <a:rPr lang="en-US" sz="3200" b="1" noProof="1">
-                <a:solidFill>
-                  <a:schemeClr val="tx2"/>
-                </a:solidFill>
-                <a:latin typeface="Consolas" panose="020B0609020204030204" pitchFamily="49" charset="0"/>
-              </a:rPr>
-              <a:t>       </a:t>
+              <a:t>AND</a:t>
             </a:r>
             <a:r>
               <a:rPr lang="en-US" sz="3200" b="1" noProof="1">
                 <a:latin typeface="Consolas" panose="020B0609020204030204" pitchFamily="49" charset="0"/>
               </a:rPr>
-              <a:t>FROM</a:t>
-            </a:r>
-            <a:r>
-              <a:rPr lang="en-US" sz="3200" b="1" noProof="1">
-                <a:solidFill>
-                  <a:schemeClr val="tx2"/>
-                </a:solidFill>
-                <a:latin typeface="Consolas" panose="020B0609020204030204" pitchFamily="49" charset="0"/>
-              </a:rPr>
-              <a:t> </a:t>
+              <a:t> o.OrderDate </a:t>
             </a:r>
             <a:r>
               <a:rPr lang="en-US" sz="3200" b="1" noProof="1">
@@ -10285,31 +10326,13 @@
                 </a:solidFill>
                 <a:latin typeface="Consolas" panose="020B0609020204030204" pitchFamily="49" charset="0"/>
               </a:rPr>
-              <a:t>Employees</a:t>
-            </a:r>
-            <a:r>
-              <a:rPr lang="en-US" sz="3200" b="1" noProof="1">
-                <a:solidFill>
-                  <a:schemeClr val="tx2"/>
-                </a:solidFill>
-                <a:latin typeface="Consolas" panose="020B0609020204030204" pitchFamily="49" charset="0"/>
-              </a:rPr>
-              <a:t> </a:t>
+              <a:t>BETWEEN</a:t>
             </a:r>
             <a:r>
               <a:rPr lang="en-US" sz="3200" b="1" noProof="1">
                 <a:latin typeface="Consolas" panose="020B0609020204030204" pitchFamily="49" charset="0"/>
               </a:rPr>
-              <a:t>AS</a:t>
-            </a:r>
-            <a:r>
-              <a:rPr lang="en-US" sz="3200" b="1" noProof="1">
-                <a:solidFill>
-                  <a:schemeClr val="tx2"/>
-                </a:solidFill>
-                <a:latin typeface="Consolas" panose="020B0609020204030204" pitchFamily="49" charset="0"/>
-              </a:rPr>
-              <a:t> </a:t>
+              <a:t> '2023-01-01' </a:t>
             </a:r>
             <a:r>
               <a:rPr lang="en-US" sz="3200" b="1" noProof="1">
@@ -10318,7 +10341,13 @@
                 </a:solidFill>
                 <a:latin typeface="Consolas" panose="020B0609020204030204" pitchFamily="49" charset="0"/>
               </a:rPr>
-              <a:t>e</a:t>
+              <a:t>AND</a:t>
+            </a:r>
+            <a:r>
+              <a:rPr lang="en-US" sz="3200" b="1" noProof="1">
+                <a:latin typeface="Consolas" panose="020B0609020204030204" pitchFamily="49" charset="0"/>
+              </a:rPr>
+              <a:t> '2023-12-31’</a:t>
             </a:r>
           </a:p>
           <a:p>
@@ -10329,73 +10358,9 @@
             </a:pPr>
             <a:r>
               <a:rPr lang="en-US" sz="3200" b="1" noProof="1">
-                <a:solidFill>
-                  <a:schemeClr val="tx2"/>
-                </a:solidFill>
                 <a:latin typeface="Consolas" panose="020B0609020204030204" pitchFamily="49" charset="0"/>
               </a:rPr>
-              <a:t>   </a:t>
-            </a:r>
-            <a:r>
-              <a:rPr lang="en-US" sz="3200" b="1" noProof="1">
-                <a:latin typeface="Consolas" panose="020B0609020204030204" pitchFamily="49" charset="0"/>
-              </a:rPr>
-              <a:t>GROUP BY e.DepartmentID</a:t>
-            </a:r>
-          </a:p>
-          <a:p>
-            <a:pPr>
-              <a:lnSpc>
-                <a:spcPct val="105000"/>
-              </a:lnSpc>
-            </a:pPr>
-            <a:r>
-              <a:rPr lang="en-US" sz="3200" b="1" noProof="1">
-                <a:solidFill>
-                  <a:schemeClr val="tx2"/>
-                </a:solidFill>
-                <a:latin typeface="Consolas" panose="020B0609020204030204" pitchFamily="49" charset="0"/>
-              </a:rPr>
-              <a:t>  </a:t>
-            </a:r>
-            <a:r>
-              <a:rPr lang="en-US" sz="3200" b="1" noProof="1">
-                <a:latin typeface="Consolas" panose="020B0609020204030204" pitchFamily="49" charset="0"/>
-              </a:rPr>
-              <a:t>)</a:t>
-            </a:r>
-            <a:r>
-              <a:rPr lang="en-US" sz="3200" b="1" noProof="1">
-                <a:solidFill>
-                  <a:schemeClr val="tx2"/>
-                </a:solidFill>
-                <a:latin typeface="Consolas" panose="020B0609020204030204" pitchFamily="49" charset="0"/>
-              </a:rPr>
-              <a:t> </a:t>
-            </a:r>
-            <a:r>
-              <a:rPr lang="en-US" sz="3200" b="1" noProof="1">
-                <a:latin typeface="Consolas" panose="020B0609020204030204" pitchFamily="49" charset="0"/>
-              </a:rPr>
-              <a:t>AS</a:t>
-            </a:r>
-            <a:r>
-              <a:rPr lang="en-US" sz="3200" b="1" noProof="1">
-                <a:solidFill>
-                  <a:schemeClr val="tx2"/>
-                </a:solidFill>
-                <a:latin typeface="Consolas" panose="020B0609020204030204" pitchFamily="49" charset="0"/>
-              </a:rPr>
-              <a:t> </a:t>
-            </a:r>
-            <a:r>
-              <a:rPr lang="en-US" sz="3200" b="1" noProof="1">
-                <a:solidFill>
-                  <a:schemeClr val="bg1"/>
-                </a:solidFill>
-                <a:latin typeface="Consolas" panose="020B0609020204030204" pitchFamily="49" charset="0"/>
-              </a:rPr>
-              <a:t>a</a:t>
+              <a:t>);</a:t>
             </a:r>
             <a:endParaRPr lang="en-US" sz="3200" noProof="1">
               <a:solidFill>
@@ -10433,14 +10398,62 @@
             </a:r>
             <a:r>
               <a:rPr lang="bg-BG" dirty="0"/>
-              <a:t>Минимална средна заплата</a:t>
+              <a:t>Поръчки през 2023</a:t>
             </a:r>
           </a:p>
         </p:txBody>
       </p:sp>
       <p:sp>
         <p:nvSpPr>
-          <p:cNvPr id="12" name="AutoShape 7"/>
+          <p:cNvPr id="2" name="Slide Number">
+            <a:extLst>
+              <a:ext uri="{FF2B5EF4-FFF2-40B4-BE49-F238E27FC236}">
+                <a16:creationId xmlns:a16="http://schemas.microsoft.com/office/drawing/2014/main" id="{04B47E20-3F12-8E97-A139-02A9AEDAFF7C}"/>
+              </a:ext>
+            </a:extLst>
+          </p:cNvPr>
+          <p:cNvSpPr>
+            <a:spLocks noGrp="1"/>
+          </p:cNvSpPr>
+          <p:nvPr>
+            <p:ph type="sldNum" sz="quarter" idx="5"/>
+          </p:nvPr>
+        </p:nvSpPr>
+        <p:spPr>
+          <a:xfrm>
+            <a:off x="11753030" y="6507000"/>
+            <a:ext cx="367414" cy="297000"/>
+          </a:xfrm>
+          <a:prstGeom prst="rect">
+            <a:avLst/>
+          </a:prstGeom>
+        </p:spPr>
+        <p:txBody>
+          <a:bodyPr vert="horz" lIns="91440" tIns="45720" rIns="91440" bIns="45720" rtlCol="0" anchor="b"/>
+          <a:lstStyle>
+            <a:lvl1pPr algn="r">
+              <a:defRPr sz="1000"/>
+            </a:lvl1pPr>
+          </a:lstStyle>
+          <a:p>
+            <a:fld id="{2BF067CD-8E6B-4360-9AA8-C5DF2A48A6D1}" type="slidenum">
+              <a:rPr lang="en-US" noProof="0" smtClean="0"/>
+              <a:pPr/>
+              <a:t>12</a:t>
+            </a:fld>
+            <a:endParaRPr lang="en-US" noProof="0" dirty="0"/>
+          </a:p>
+        </p:txBody>
+      </p:sp>
+      <p:sp>
+        <p:nvSpPr>
+          <p:cNvPr id="3" name="AutoShape 7">
+            <a:extLst>
+              <a:ext uri="{FF2B5EF4-FFF2-40B4-BE49-F238E27FC236}">
+                <a16:creationId xmlns:a16="http://schemas.microsoft.com/office/drawing/2014/main" id="{8B7A4CDF-AC80-91D6-49E1-F1D673F0654D}"/>
+              </a:ext>
+            </a:extLst>
+          </p:cNvPr>
           <p:cNvSpPr>
             <a:spLocks noChangeArrowheads="1"/>
           </p:cNvSpPr>
@@ -10448,13 +10461,13 @@
         </p:nvSpPr>
         <p:spPr bwMode="auto">
           <a:xfrm>
-            <a:off x="152400" y="3733800"/>
-            <a:ext cx="1981200" cy="565268"/>
+            <a:off x="4701000" y="3154879"/>
+            <a:ext cx="1726782" cy="548241"/>
           </a:xfrm>
           <a:prstGeom prst="wedgeRoundRectCallout">
             <a:avLst>
-              <a:gd name="adj1" fmla="val 51458"/>
-              <a:gd name="adj2" fmla="val 91880"/>
+              <a:gd name="adj1" fmla="val -90259"/>
+              <a:gd name="adj2" fmla="val -1848"/>
               <a:gd name="adj3" fmla="val 16667"/>
             </a:avLst>
           </a:prstGeom>
@@ -10499,7 +10512,7 @@
           <a:p>
             <a:pPr algn="ctr"/>
             <a:r>
-              <a:rPr lang="bg-BG" sz="2800" b="1" noProof="1">
+              <a:rPr lang="en-US" sz="2800" b="1" noProof="1">
                 <a:solidFill>
                   <a:srgbClr val="FFFFFF"/>
                 </a:solidFill>
@@ -10511,158 +10524,8 @@
                   </a:outerShdw>
                 </a:effectLst>
               </a:rPr>
-              <a:t>Подзаявка</a:t>
-            </a:r>
-            <a:endParaRPr lang="en-US" sz="2800" b="1" noProof="1">
-              <a:solidFill>
-                <a:srgbClr val="FFFFFF"/>
-              </a:solidFill>
-              <a:effectLst>
-                <a:outerShdw blurRad="38100" dist="38100" dir="2700000" algn="tl">
-                  <a:srgbClr val="000000">
-                    <a:alpha val="43137"/>
-                  </a:srgbClr>
-                </a:outerShdw>
-              </a:effectLst>
-            </a:endParaRPr>
-          </a:p>
-        </p:txBody>
-      </p:sp>
-      <p:sp>
-        <p:nvSpPr>
-          <p:cNvPr id="13" name="AutoShape 7"/>
-          <p:cNvSpPr>
-            <a:spLocks noChangeArrowheads="1"/>
-          </p:cNvSpPr>
-          <p:nvPr/>
-        </p:nvSpPr>
-        <p:spPr bwMode="auto">
-          <a:xfrm>
-            <a:off x="8001000" y="4648200"/>
-            <a:ext cx="3272858" cy="609599"/>
-          </a:xfrm>
-          <a:prstGeom prst="wedgeRoundRectCallout">
-            <a:avLst>
-              <a:gd name="adj1" fmla="val -72100"/>
-              <a:gd name="adj2" fmla="val -15369"/>
-              <a:gd name="adj3" fmla="val 16667"/>
-            </a:avLst>
-          </a:prstGeom>
-          <a:solidFill>
-            <a:schemeClr val="tx1">
-              <a:alpha val="80000"/>
-            </a:schemeClr>
-          </a:solidFill>
-          <a:ln w="19050">
-            <a:solidFill>
-              <a:schemeClr val="tx1">
-                <a:alpha val="80000"/>
-              </a:schemeClr>
-            </a:solidFill>
-          </a:ln>
-          <a:effectLst/>
-        </p:spPr>
-        <p:style>
-          <a:lnRef idx="2">
-            <a:schemeClr val="accent1">
-              <a:shade val="50000"/>
-            </a:schemeClr>
-          </a:lnRef>
-          <a:fillRef idx="1001">
-            <a:schemeClr val="dk2"/>
-          </a:fillRef>
-          <a:effectRef idx="0">
-            <a:schemeClr val="accent1"/>
-          </a:effectRef>
-          <a:fontRef idx="minor">
-            <a:schemeClr val="lt1"/>
-          </a:fontRef>
-        </p:style>
-        <p:txBody>
-          <a:bodyPr rot="0" spcFirstLastPara="0" vertOverflow="overflow" horzOverflow="overflow" vert="horz" wrap="square" lIns="91440" tIns="45720" rIns="91440" bIns="45720" numCol="1" spcCol="0" rtlCol="0" fromWordArt="0" anchor="ctr" anchorCtr="0" forceAA="0" compatLnSpc="1">
-            <a:prstTxWarp prst="textNoShape">
-              <a:avLst/>
-            </a:prstTxWarp>
-            <a:noAutofit/>
-          </a:bodyPr>
-          <a:lstStyle/>
-          <a:p>
-            <a:pPr algn="ctr"/>
-            <a:r>
-              <a:rPr lang="bg-BG" sz="2800" b="1" noProof="1">
-                <a:solidFill>
-                  <a:srgbClr val="FFFFFF"/>
-                </a:solidFill>
-                <a:effectLst>
-                  <a:outerShdw blurRad="38100" dist="38100" dir="2700000" algn="tl">
-                    <a:srgbClr val="000000">
-                      <a:alpha val="43137"/>
-                    </a:srgbClr>
-                  </a:outerShdw>
-                </a:effectLst>
-              </a:rPr>
-              <a:t>Таблица </a:t>
-            </a:r>
-            <a:r>
-              <a:rPr lang="en-US" sz="2800" b="1" noProof="1">
-                <a:solidFill>
-                  <a:schemeClr val="bg1">
-                    <a:lumMod val="60000"/>
-                    <a:lumOff val="40000"/>
-                  </a:schemeClr>
-                </a:solidFill>
-                <a:effectLst>
-                  <a:outerShdw blurRad="38100" dist="38100" dir="2700000" algn="tl">
-                    <a:srgbClr val="000000">
-                      <a:alpha val="43137"/>
-                    </a:srgbClr>
-                  </a:outerShdw>
-                </a:effectLst>
-              </a:rPr>
-              <a:t>Employees</a:t>
-            </a:r>
-          </a:p>
-        </p:txBody>
-      </p:sp>
-      <p:sp>
-        <p:nvSpPr>
-          <p:cNvPr id="2" name="Slide Number">
-            <a:extLst>
-              <a:ext uri="{FF2B5EF4-FFF2-40B4-BE49-F238E27FC236}">
-                <a16:creationId xmlns:a16="http://schemas.microsoft.com/office/drawing/2014/main" id="{04B47E20-3F12-8E97-A139-02A9AEDAFF7C}"/>
-              </a:ext>
-            </a:extLst>
-          </p:cNvPr>
-          <p:cNvSpPr>
-            <a:spLocks noGrp="1"/>
-          </p:cNvSpPr>
-          <p:nvPr>
-            <p:ph type="sldNum" sz="quarter" idx="5"/>
-          </p:nvPr>
-        </p:nvSpPr>
-        <p:spPr>
-          <a:xfrm>
-            <a:off x="11753030" y="6507000"/>
-            <a:ext cx="367414" cy="297000"/>
-          </a:xfrm>
-          <a:prstGeom prst="rect">
-            <a:avLst/>
-          </a:prstGeom>
-        </p:spPr>
-        <p:txBody>
-          <a:bodyPr vert="horz" lIns="91440" tIns="45720" rIns="91440" bIns="45720" rtlCol="0" anchor="b"/>
-          <a:lstStyle>
-            <a:lvl1pPr algn="r">
-              <a:defRPr sz="1000"/>
-            </a:lvl1pPr>
-          </a:lstStyle>
-          <a:p>
-            <a:fld id="{2BF067CD-8E6B-4360-9AA8-C5DF2A48A6D1}" type="slidenum">
-              <a:rPr lang="en-US" noProof="0" smtClean="0"/>
-              <a:pPr/>
-              <a:t>12</a:t>
-            </a:fld>
-            <a:endParaRPr lang="en-US" noProof="0" dirty="0"/>
+              <a:t>True</a:t>
+            </a:r>
           </a:p>
         </p:txBody>
       </p:sp>
@@ -10705,7 +10568,7 @@
                             </p:stCondLst>
                             <p:childTnLst>
                               <p:par>
-                                <p:cTn id="5" presetID="1" presetClass="entr" presetSubtype="0" fill="hold" nodeType="clickEffect">
+                                <p:cTn id="5" presetID="1" presetClass="entr" presetSubtype="0" fill="hold" grpId="0" nodeType="clickEffect">
                                   <p:stCondLst>
                                     <p:cond delay="0"/>
                                   </p:stCondLst>
@@ -10718,176 +10581,7 @@
                                           </p:stCondLst>
                                         </p:cTn>
                                         <p:tgtEl>
-                                          <p:spTgt spid="10">
-                                            <p:txEl>
-                                              <p:pRg st="3" end="3"/>
-                                            </p:txEl>
-                                          </p:spTgt>
-                                        </p:tgtEl>
-                                        <p:attrNameLst>
-                                          <p:attrName>style.visibility</p:attrName>
-                                        </p:attrNameLst>
-                                      </p:cBhvr>
-                                      <p:to>
-                                        <p:strVal val="visible"/>
-                                      </p:to>
-                                    </p:set>
-                                  </p:childTnLst>
-                                </p:cTn>
-                              </p:par>
-                              <p:par>
-                                <p:cTn id="7" presetID="1" presetClass="entr" presetSubtype="0" fill="hold" nodeType="withEffect">
-                                  <p:stCondLst>
-                                    <p:cond delay="0"/>
-                                  </p:stCondLst>
-                                  <p:childTnLst>
-                                    <p:set>
-                                      <p:cBhvr>
-                                        <p:cTn id="8" dur="1" fill="hold">
-                                          <p:stCondLst>
-                                            <p:cond delay="0"/>
-                                          </p:stCondLst>
-                                        </p:cTn>
-                                        <p:tgtEl>
-                                          <p:spTgt spid="10">
-                                            <p:txEl>
-                                              <p:pRg st="4" end="4"/>
-                                            </p:txEl>
-                                          </p:spTgt>
-                                        </p:tgtEl>
-                                        <p:attrNameLst>
-                                          <p:attrName>style.visibility</p:attrName>
-                                        </p:attrNameLst>
-                                      </p:cBhvr>
-                                      <p:to>
-                                        <p:strVal val="visible"/>
-                                      </p:to>
-                                    </p:set>
-                                  </p:childTnLst>
-                                </p:cTn>
-                              </p:par>
-                              <p:par>
-                                <p:cTn id="9" presetID="1" presetClass="entr" presetSubtype="0" fill="hold" nodeType="withEffect">
-                                  <p:stCondLst>
-                                    <p:cond delay="0"/>
-                                  </p:stCondLst>
-                                  <p:childTnLst>
-                                    <p:set>
-                                      <p:cBhvr>
-                                        <p:cTn id="10" dur="1" fill="hold">
-                                          <p:stCondLst>
-                                            <p:cond delay="0"/>
-                                          </p:stCondLst>
-                                        </p:cTn>
-                                        <p:tgtEl>
-                                          <p:spTgt spid="10">
-                                            <p:txEl>
-                                              <p:pRg st="5" end="5"/>
-                                            </p:txEl>
-                                          </p:spTgt>
-                                        </p:tgtEl>
-                                        <p:attrNameLst>
-                                          <p:attrName>style.visibility</p:attrName>
-                                        </p:attrNameLst>
-                                      </p:cBhvr>
-                                      <p:to>
-                                        <p:strVal val="visible"/>
-                                      </p:to>
-                                    </p:set>
-                                  </p:childTnLst>
-                                </p:cTn>
-                              </p:par>
-                              <p:par>
-                                <p:cTn id="11" presetID="1" presetClass="entr" presetSubtype="0" fill="hold" nodeType="withEffect">
-                                  <p:stCondLst>
-                                    <p:cond delay="0"/>
-                                  </p:stCondLst>
-                                  <p:childTnLst>
-                                    <p:set>
-                                      <p:cBhvr>
-                                        <p:cTn id="12" dur="1" fill="hold">
-                                          <p:stCondLst>
-                                            <p:cond delay="0"/>
-                                          </p:stCondLst>
-                                        </p:cTn>
-                                        <p:tgtEl>
-                                          <p:spTgt spid="10">
-                                            <p:txEl>
-                                              <p:pRg st="6" end="6"/>
-                                            </p:txEl>
-                                          </p:spTgt>
-                                        </p:tgtEl>
-                                        <p:attrNameLst>
-                                          <p:attrName>style.visibility</p:attrName>
-                                        </p:attrNameLst>
-                                      </p:cBhvr>
-                                      <p:to>
-                                        <p:strVal val="visible"/>
-                                      </p:to>
-                                    </p:set>
-                                  </p:childTnLst>
-                                </p:cTn>
-                              </p:par>
-                              <p:par>
-                                <p:cTn id="13" presetID="1" presetClass="entr" presetSubtype="0" fill="hold" grpId="0" nodeType="withEffect">
-                                  <p:stCondLst>
-                                    <p:cond delay="0"/>
-                                  </p:stCondLst>
-                                  <p:childTnLst>
-                                    <p:set>
-                                      <p:cBhvr>
-                                        <p:cTn id="14" dur="1" fill="hold">
-                                          <p:stCondLst>
-                                            <p:cond delay="0"/>
-                                          </p:stCondLst>
-                                        </p:cTn>
-                                        <p:tgtEl>
-                                          <p:spTgt spid="12"/>
-                                        </p:tgtEl>
-                                        <p:attrNameLst>
-                                          <p:attrName>style.visibility</p:attrName>
-                                        </p:attrNameLst>
-                                      </p:cBhvr>
-                                      <p:to>
-                                        <p:strVal val="visible"/>
-                                      </p:to>
-                                    </p:set>
-                                  </p:childTnLst>
-                                </p:cTn>
-                              </p:par>
-                            </p:childTnLst>
-                          </p:cTn>
-                        </p:par>
-                      </p:childTnLst>
-                    </p:cTn>
-                  </p:par>
-                  <p:par>
-                    <p:cTn id="15" fill="hold">
-                      <p:stCondLst>
-                        <p:cond delay="indefinite"/>
-                      </p:stCondLst>
-                      <p:childTnLst>
-                        <p:par>
-                          <p:cTn id="16" fill="hold">
-                            <p:stCondLst>
-                              <p:cond delay="0"/>
-                            </p:stCondLst>
-                            <p:childTnLst>
-                              <p:par>
-                                <p:cTn id="17" presetID="1" presetClass="entr" presetSubtype="0" fill="hold" grpId="0" nodeType="clickEffect">
-                                  <p:stCondLst>
-                                    <p:cond delay="0"/>
-                                  </p:stCondLst>
-                                  <p:childTnLst>
-                                    <p:set>
-                                      <p:cBhvr>
-                                        <p:cTn id="18" dur="1" fill="hold">
-                                          <p:stCondLst>
-                                            <p:cond delay="0"/>
-                                          </p:stCondLst>
-                                        </p:cTn>
-                                        <p:tgtEl>
-                                          <p:spTgt spid="13"/>
+                                          <p:spTgt spid="3"/>
                                         </p:tgtEl>
                                         <p:attrNameLst>
                                           <p:attrName>style.visibility</p:attrName>
@@ -10928,8 +10622,7 @@
       </p:par>
     </p:tnLst>
     <p:bldLst>
-      <p:bldP spid="12" grpId="0" animBg="1"/>
-      <p:bldP spid="13" grpId="0" animBg="1"/>
+      <p:bldP spid="3" grpId="0" animBg="1"/>
     </p:bldLst>
   </p:timing>
 </p:sld>

</xml_diff>

<commit_message>
Small update on Complex Joins and Subqueries slides
</commit_message>
<xml_diff>
--- a/Courses/Software-Sciences/Module-3-Databases-New/10-Complex-Joins-and-Subqueries/10-Complex-Joins-and-Subqueries.pptx
+++ b/Courses/Software-Sciences/Module-3-Databases-New/10-Complex-Joins-and-Subqueries/10-Complex-Joins-and-Subqueries.pptx
@@ -8705,10 +8705,10 @@
       </p:pic>
       <p:pic>
         <p:nvPicPr>
-          <p:cNvPr id="4" name="Picture 3" descr="A yellow and blue sign with white text&#10;&#10;Description automatically generated">
+          <p:cNvPr id="2" name="Picture 1">
             <a:extLst>
               <a:ext uri="{FF2B5EF4-FFF2-40B4-BE49-F238E27FC236}">
-                <a16:creationId xmlns:a16="http://schemas.microsoft.com/office/drawing/2014/main" id="{58EAF72C-A6F6-38F4-3AD5-8CFC544AFA1D}"/>
+                <a16:creationId xmlns:a16="http://schemas.microsoft.com/office/drawing/2014/main" id="{4225438C-AA3D-A0FB-2A1A-37C93C43F870}"/>
               </a:ext>
             </a:extLst>
           </p:cNvPr>
@@ -8725,14 +8725,13 @@
               </a:ext>
             </a:extLst>
           </a:blip>
-          <a:stretch>
-            <a:fillRect/>
-          </a:stretch>
+          <a:srcRect/>
+          <a:stretch/>
         </p:blipFill>
         <p:spPr>
           <a:xfrm>
-            <a:off x="584311" y="3001428"/>
-            <a:ext cx="1956689" cy="877572"/>
+            <a:off x="584311" y="3002368"/>
+            <a:ext cx="1956689" cy="875691"/>
           </a:xfrm>
           <a:prstGeom prst="rect">
             <a:avLst/>

</xml_diff>